<commit_message>
20211209 ~ 20211210 : 기능 완료... 11까지 최종 검토
</commit_message>
<xml_diff>
--- a/서버 구성.pptx
+++ b/서버 구성.pptx
@@ -6,12 +6,13 @@
   </p:sldMasterIdLst>
   <p:sldIdLst>
     <p:sldId id="262" r:id="rId2"/>
-    <p:sldId id="256" r:id="rId3"/>
-    <p:sldId id="257" r:id="rId4"/>
-    <p:sldId id="258" r:id="rId5"/>
-    <p:sldId id="259" r:id="rId6"/>
-    <p:sldId id="260" r:id="rId7"/>
-    <p:sldId id="261" r:id="rId8"/>
+    <p:sldId id="263" r:id="rId3"/>
+    <p:sldId id="256" r:id="rId4"/>
+    <p:sldId id="257" r:id="rId5"/>
+    <p:sldId id="258" r:id="rId6"/>
+    <p:sldId id="259" r:id="rId7"/>
+    <p:sldId id="260" r:id="rId8"/>
+    <p:sldId id="261" r:id="rId9"/>
   </p:sldIdLst>
   <p:sldSz cx="12192000" cy="6858000"/>
   <p:notesSz cx="6858000" cy="9144000"/>
@@ -110,6 +111,11 @@
       </a:defRPr>
     </a:lvl9pPr>
   </p:defaultTextStyle>
+  <p:extLst>
+    <p:ext uri="{EFAFB233-063F-42B5-8137-9DF3F51BA10A}">
+      <p15:sldGuideLst xmlns:p15="http://schemas.microsoft.com/office/powerpoint/2012/main"/>
+    </p:ext>
+  </p:extLst>
 </p:presentation>
 </file>
 
@@ -260,7 +266,7 @@
           <a:p>
             <a:fld id="{4E695BD3-0D4C-4569-ADD7-00F5C7CC7E3F}" type="datetimeFigureOut">
               <a:rPr lang="ko-KR" altLang="en-US" smtClean="0"/>
-              <a:t>2021-12-07</a:t>
+              <a:t>2021-12-10</a:t>
             </a:fld>
             <a:endParaRPr lang="ko-KR" altLang="en-US"/>
           </a:p>
@@ -458,7 +464,7 @@
           <a:p>
             <a:fld id="{4E695BD3-0D4C-4569-ADD7-00F5C7CC7E3F}" type="datetimeFigureOut">
               <a:rPr lang="ko-KR" altLang="en-US" smtClean="0"/>
-              <a:t>2021-12-07</a:t>
+              <a:t>2021-12-10</a:t>
             </a:fld>
             <a:endParaRPr lang="ko-KR" altLang="en-US"/>
           </a:p>
@@ -666,7 +672,7 @@
           <a:p>
             <a:fld id="{4E695BD3-0D4C-4569-ADD7-00F5C7CC7E3F}" type="datetimeFigureOut">
               <a:rPr lang="ko-KR" altLang="en-US" smtClean="0"/>
-              <a:t>2021-12-07</a:t>
+              <a:t>2021-12-10</a:t>
             </a:fld>
             <a:endParaRPr lang="ko-KR" altLang="en-US"/>
           </a:p>
@@ -864,7 +870,7 @@
           <a:p>
             <a:fld id="{4E695BD3-0D4C-4569-ADD7-00F5C7CC7E3F}" type="datetimeFigureOut">
               <a:rPr lang="ko-KR" altLang="en-US" smtClean="0"/>
-              <a:t>2021-12-07</a:t>
+              <a:t>2021-12-10</a:t>
             </a:fld>
             <a:endParaRPr lang="ko-KR" altLang="en-US"/>
           </a:p>
@@ -1139,7 +1145,7 @@
           <a:p>
             <a:fld id="{4E695BD3-0D4C-4569-ADD7-00F5C7CC7E3F}" type="datetimeFigureOut">
               <a:rPr lang="ko-KR" altLang="en-US" smtClean="0"/>
-              <a:t>2021-12-07</a:t>
+              <a:t>2021-12-10</a:t>
             </a:fld>
             <a:endParaRPr lang="ko-KR" altLang="en-US"/>
           </a:p>
@@ -1404,7 +1410,7 @@
           <a:p>
             <a:fld id="{4E695BD3-0D4C-4569-ADD7-00F5C7CC7E3F}" type="datetimeFigureOut">
               <a:rPr lang="ko-KR" altLang="en-US" smtClean="0"/>
-              <a:t>2021-12-07</a:t>
+              <a:t>2021-12-10</a:t>
             </a:fld>
             <a:endParaRPr lang="ko-KR" altLang="en-US"/>
           </a:p>
@@ -1816,7 +1822,7 @@
           <a:p>
             <a:fld id="{4E695BD3-0D4C-4569-ADD7-00F5C7CC7E3F}" type="datetimeFigureOut">
               <a:rPr lang="ko-KR" altLang="en-US" smtClean="0"/>
-              <a:t>2021-12-07</a:t>
+              <a:t>2021-12-10</a:t>
             </a:fld>
             <a:endParaRPr lang="ko-KR" altLang="en-US"/>
           </a:p>
@@ -1957,7 +1963,7 @@
           <a:p>
             <a:fld id="{4E695BD3-0D4C-4569-ADD7-00F5C7CC7E3F}" type="datetimeFigureOut">
               <a:rPr lang="ko-KR" altLang="en-US" smtClean="0"/>
-              <a:t>2021-12-07</a:t>
+              <a:t>2021-12-10</a:t>
             </a:fld>
             <a:endParaRPr lang="ko-KR" altLang="en-US"/>
           </a:p>
@@ -2070,7 +2076,7 @@
           <a:p>
             <a:fld id="{4E695BD3-0D4C-4569-ADD7-00F5C7CC7E3F}" type="datetimeFigureOut">
               <a:rPr lang="ko-KR" altLang="en-US" smtClean="0"/>
-              <a:t>2021-12-07</a:t>
+              <a:t>2021-12-10</a:t>
             </a:fld>
             <a:endParaRPr lang="ko-KR" altLang="en-US"/>
           </a:p>
@@ -2381,7 +2387,7 @@
           <a:p>
             <a:fld id="{4E695BD3-0D4C-4569-ADD7-00F5C7CC7E3F}" type="datetimeFigureOut">
               <a:rPr lang="ko-KR" altLang="en-US" smtClean="0"/>
-              <a:t>2021-12-07</a:t>
+              <a:t>2021-12-10</a:t>
             </a:fld>
             <a:endParaRPr lang="ko-KR" altLang="en-US"/>
           </a:p>
@@ -2669,7 +2675,7 @@
           <a:p>
             <a:fld id="{4E695BD3-0D4C-4569-ADD7-00F5C7CC7E3F}" type="datetimeFigureOut">
               <a:rPr lang="ko-KR" altLang="en-US" smtClean="0"/>
-              <a:t>2021-12-07</a:t>
+              <a:t>2021-12-10</a:t>
             </a:fld>
             <a:endParaRPr lang="ko-KR" altLang="en-US"/>
           </a:p>
@@ -2910,7 +2916,7 @@
           <a:p>
             <a:fld id="{4E695BD3-0D4C-4569-ADD7-00F5C7CC7E3F}" type="datetimeFigureOut">
               <a:rPr lang="ko-KR" altLang="en-US" smtClean="0"/>
-              <a:t>2021-12-07</a:t>
+              <a:t>2021-12-10</a:t>
             </a:fld>
             <a:endParaRPr lang="ko-KR" altLang="en-US"/>
           </a:p>
@@ -3449,7 +3455,7 @@
         </p:nvSpPr>
         <p:spPr>
           <a:xfrm>
-            <a:off x="3393052" y="2302252"/>
+            <a:off x="3393052" y="2290106"/>
             <a:ext cx="1560352" cy="369332"/>
           </a:xfrm>
           <a:prstGeom prst="rect">
@@ -3503,6 +3509,14 @@
             <a:pPr algn="ctr"/>
             <a:r>
               <a:rPr lang="en-US" altLang="ko-KR" dirty="0"/>
+              <a:t>C#</a:t>
+            </a:r>
+            <a:r>
+              <a:rPr lang="ko-KR" altLang="en-US" dirty="0"/>
+              <a:t> </a:t>
+            </a:r>
+            <a:r>
+              <a:rPr lang="en-US" altLang="ko-KR" dirty="0"/>
               <a:t>Server</a:t>
             </a:r>
             <a:endParaRPr lang="ko-KR" altLang="en-US" dirty="0"/>
@@ -3576,8 +3590,8 @@
           <a:p>
             <a:pPr algn="ctr"/>
             <a:r>
-              <a:rPr lang="en-US" altLang="ko-KR" dirty="0" err="1"/>
-              <a:t>DataBase</a:t>
+              <a:rPr lang="en-US" altLang="ko-KR" dirty="0"/>
+              <a:t>MS-SQL DB</a:t>
             </a:r>
             <a:endParaRPr lang="ko-KR" altLang="en-US" dirty="0"/>
           </a:p>
@@ -3857,6 +3871,7 @@
             <a:solidFill>
               <a:schemeClr val="tx1"/>
             </a:solidFill>
+            <a:headEnd type="triangle"/>
             <a:tailEnd type="triangle"/>
           </a:ln>
         </p:spPr>
@@ -3946,6 +3961,47 @@
               <a:t>Port 9000</a:t>
             </a:r>
             <a:endParaRPr lang="ko-KR" altLang="en-US" sz="1500" dirty="0"/>
+          </a:p>
+        </p:txBody>
+      </p:sp>
+      <p:sp>
+        <p:nvSpPr>
+          <p:cNvPr id="34" name="TextBox 33">
+            <a:extLst>
+              <a:ext uri="{FF2B5EF4-FFF2-40B4-BE49-F238E27FC236}">
+                <a16:creationId xmlns:a16="http://schemas.microsoft.com/office/drawing/2014/main" id="{70366B71-0971-4D83-ACFE-1D6E77E750F4}"/>
+              </a:ext>
+            </a:extLst>
+          </p:cNvPr>
+          <p:cNvSpPr txBox="1"/>
+          <p:nvPr/>
+        </p:nvSpPr>
+        <p:spPr>
+          <a:xfrm>
+            <a:off x="7934036" y="5795899"/>
+            <a:ext cx="3648364" cy="292388"/>
+          </a:xfrm>
+          <a:prstGeom prst="rect">
+            <a:avLst/>
+          </a:prstGeom>
+          <a:noFill/>
+        </p:spPr>
+        <p:txBody>
+          <a:bodyPr wrap="square" rtlCol="0">
+            <a:spAutoFit/>
+          </a:bodyPr>
+          <a:lstStyle/>
+          <a:p>
+            <a:pPr algn="ctr"/>
+            <a:r>
+              <a:rPr lang="ko-KR" altLang="en-US" sz="1300" dirty="0"/>
+              <a:t>아이콘 출처 </a:t>
+            </a:r>
+            <a:r>
+              <a:rPr lang="en-US" altLang="ko-KR" sz="1300" dirty="0"/>
+              <a:t>: ICONS8</a:t>
+            </a:r>
+            <a:endParaRPr lang="ko-KR" altLang="en-US" sz="1300" dirty="0"/>
           </a:p>
         </p:txBody>
       </p:sp>
@@ -3979,6 +4035,631 @@
           <a:chExt cx="0" cy="0"/>
         </a:xfrm>
       </p:grpSpPr>
+      <p:pic>
+        <p:nvPicPr>
+          <p:cNvPr id="5" name="그림 4" descr="마스크이(가) 표시된 사진&#10;&#10;자동 생성된 설명">
+            <a:extLst>
+              <a:ext uri="{FF2B5EF4-FFF2-40B4-BE49-F238E27FC236}">
+                <a16:creationId xmlns:a16="http://schemas.microsoft.com/office/drawing/2014/main" id="{F435075B-67D9-4775-9242-094D8C476452}"/>
+              </a:ext>
+            </a:extLst>
+          </p:cNvPr>
+          <p:cNvPicPr>
+            <a:picLocks noChangeAspect="1"/>
+          </p:cNvPicPr>
+          <p:nvPr/>
+        </p:nvPicPr>
+        <p:blipFill>
+          <a:blip r:embed="rId2">
+            <a:extLst>
+              <a:ext uri="{28A0092B-C50C-407E-A947-70E740481C1C}">
+                <a14:useLocalDpi xmlns:a14="http://schemas.microsoft.com/office/drawing/2010/main" val="0"/>
+              </a:ext>
+            </a:extLst>
+          </a:blip>
+          <a:stretch>
+            <a:fillRect/>
+          </a:stretch>
+        </p:blipFill>
+        <p:spPr>
+          <a:xfrm>
+            <a:off x="3454354" y="873502"/>
+            <a:ext cx="1428750" cy="1428750"/>
+          </a:xfrm>
+          <a:prstGeom prst="rect">
+            <a:avLst/>
+          </a:prstGeom>
+        </p:spPr>
+      </p:pic>
+      <p:pic>
+        <p:nvPicPr>
+          <p:cNvPr id="7" name="그림 6">
+            <a:extLst>
+              <a:ext uri="{FF2B5EF4-FFF2-40B4-BE49-F238E27FC236}">
+                <a16:creationId xmlns:a16="http://schemas.microsoft.com/office/drawing/2014/main" id="{F43B38B0-598F-4BA6-8FCF-8587D14F45D6}"/>
+              </a:ext>
+            </a:extLst>
+          </p:cNvPr>
+          <p:cNvPicPr>
+            <a:picLocks noChangeAspect="1"/>
+          </p:cNvPicPr>
+          <p:nvPr/>
+        </p:nvPicPr>
+        <p:blipFill>
+          <a:blip r:embed="rId3">
+            <a:extLst>
+              <a:ext uri="{28A0092B-C50C-407E-A947-70E740481C1C}">
+                <a14:useLocalDpi xmlns:a14="http://schemas.microsoft.com/office/drawing/2010/main" val="0"/>
+              </a:ext>
+            </a:extLst>
+          </a:blip>
+          <a:stretch>
+            <a:fillRect/>
+          </a:stretch>
+        </p:blipFill>
+        <p:spPr>
+          <a:xfrm>
+            <a:off x="7822992" y="877435"/>
+            <a:ext cx="1428750" cy="1428750"/>
+          </a:xfrm>
+          <a:prstGeom prst="rect">
+            <a:avLst/>
+          </a:prstGeom>
+        </p:spPr>
+      </p:pic>
+      <p:sp>
+        <p:nvSpPr>
+          <p:cNvPr id="10" name="TextBox 9">
+            <a:extLst>
+              <a:ext uri="{FF2B5EF4-FFF2-40B4-BE49-F238E27FC236}">
+                <a16:creationId xmlns:a16="http://schemas.microsoft.com/office/drawing/2014/main" id="{7BFF3DA9-8B61-4676-9270-27DD9048BF51}"/>
+              </a:ext>
+            </a:extLst>
+          </p:cNvPr>
+          <p:cNvSpPr txBox="1"/>
+          <p:nvPr/>
+        </p:nvSpPr>
+        <p:spPr>
+          <a:xfrm>
+            <a:off x="3393052" y="2290106"/>
+            <a:ext cx="1560352" cy="369332"/>
+          </a:xfrm>
+          <a:prstGeom prst="rect">
+            <a:avLst/>
+          </a:prstGeom>
+          <a:noFill/>
+        </p:spPr>
+        <p:txBody>
+          <a:bodyPr wrap="square" rtlCol="0">
+            <a:spAutoFit/>
+          </a:bodyPr>
+          <a:lstStyle/>
+          <a:p>
+            <a:pPr algn="ctr"/>
+            <a:r>
+              <a:rPr lang="en-US" altLang="ko-KR" dirty="0"/>
+              <a:t>Pi</a:t>
+            </a:r>
+            <a:endParaRPr lang="ko-KR" altLang="en-US" dirty="0"/>
+          </a:p>
+        </p:txBody>
+      </p:sp>
+      <p:sp>
+        <p:nvSpPr>
+          <p:cNvPr id="11" name="TextBox 10">
+            <a:extLst>
+              <a:ext uri="{FF2B5EF4-FFF2-40B4-BE49-F238E27FC236}">
+                <a16:creationId xmlns:a16="http://schemas.microsoft.com/office/drawing/2014/main" id="{D24004D0-5E5B-47AB-ADBA-2278C2FD7FD6}"/>
+              </a:ext>
+            </a:extLst>
+          </p:cNvPr>
+          <p:cNvSpPr txBox="1"/>
+          <p:nvPr/>
+        </p:nvSpPr>
+        <p:spPr>
+          <a:xfrm>
+            <a:off x="4633778" y="2306138"/>
+            <a:ext cx="1560352" cy="646331"/>
+          </a:xfrm>
+          <a:prstGeom prst="rect">
+            <a:avLst/>
+          </a:prstGeom>
+          <a:noFill/>
+        </p:spPr>
+        <p:txBody>
+          <a:bodyPr wrap="square" rtlCol="0">
+            <a:spAutoFit/>
+          </a:bodyPr>
+          <a:lstStyle/>
+          <a:p>
+            <a:pPr algn="ctr"/>
+            <a:r>
+              <a:rPr lang="en-US" altLang="ko-KR" dirty="0"/>
+              <a:t>Server</a:t>
+            </a:r>
+          </a:p>
+          <a:p>
+            <a:pPr algn="ctr"/>
+            <a:r>
+              <a:rPr lang="en-US" altLang="ko-KR" dirty="0"/>
+              <a:t>(Flask)</a:t>
+            </a:r>
+            <a:endParaRPr lang="ko-KR" altLang="en-US" dirty="0"/>
+          </a:p>
+        </p:txBody>
+      </p:sp>
+      <p:sp>
+        <p:nvSpPr>
+          <p:cNvPr id="12" name="TextBox 11">
+            <a:extLst>
+              <a:ext uri="{FF2B5EF4-FFF2-40B4-BE49-F238E27FC236}">
+                <a16:creationId xmlns:a16="http://schemas.microsoft.com/office/drawing/2014/main" id="{0747804C-8C5F-4BEE-934B-C1F13D920B45}"/>
+              </a:ext>
+            </a:extLst>
+          </p:cNvPr>
+          <p:cNvSpPr txBox="1"/>
+          <p:nvPr/>
+        </p:nvSpPr>
+        <p:spPr>
+          <a:xfrm>
+            <a:off x="7757191" y="2302252"/>
+            <a:ext cx="1560352" cy="369332"/>
+          </a:xfrm>
+          <a:prstGeom prst="rect">
+            <a:avLst/>
+          </a:prstGeom>
+          <a:noFill/>
+        </p:spPr>
+        <p:txBody>
+          <a:bodyPr wrap="square" rtlCol="0">
+            <a:spAutoFit/>
+          </a:bodyPr>
+          <a:lstStyle/>
+          <a:p>
+            <a:pPr algn="ctr"/>
+            <a:r>
+              <a:rPr lang="en-US" altLang="ko-KR" dirty="0"/>
+              <a:t>Android</a:t>
+            </a:r>
+            <a:endParaRPr lang="ko-KR" altLang="en-US" dirty="0"/>
+          </a:p>
+        </p:txBody>
+      </p:sp>
+      <p:pic>
+        <p:nvPicPr>
+          <p:cNvPr id="15" name="그림 14">
+            <a:extLst>
+              <a:ext uri="{FF2B5EF4-FFF2-40B4-BE49-F238E27FC236}">
+                <a16:creationId xmlns:a16="http://schemas.microsoft.com/office/drawing/2014/main" id="{CE07D7C1-8413-4992-88E6-7E68FD2CA954}"/>
+              </a:ext>
+            </a:extLst>
+          </p:cNvPr>
+          <p:cNvPicPr>
+            <a:picLocks noChangeAspect="1"/>
+          </p:cNvPicPr>
+          <p:nvPr/>
+        </p:nvPicPr>
+        <p:blipFill>
+          <a:blip r:embed="rId4">
+            <a:extLst>
+              <a:ext uri="{28A0092B-C50C-407E-A947-70E740481C1C}">
+                <a14:useLocalDpi xmlns:a14="http://schemas.microsoft.com/office/drawing/2010/main" val="0"/>
+              </a:ext>
+            </a:extLst>
+          </a:blip>
+          <a:stretch>
+            <a:fillRect/>
+          </a:stretch>
+        </p:blipFill>
+        <p:spPr>
+          <a:xfrm>
+            <a:off x="4699579" y="873502"/>
+            <a:ext cx="1428749" cy="1428749"/>
+          </a:xfrm>
+          <a:prstGeom prst="rect">
+            <a:avLst/>
+          </a:prstGeom>
+        </p:spPr>
+      </p:pic>
+      <p:cxnSp>
+        <p:nvCxnSpPr>
+          <p:cNvPr id="21" name="직선 화살표 연결선 20">
+            <a:extLst>
+              <a:ext uri="{FF2B5EF4-FFF2-40B4-BE49-F238E27FC236}">
+                <a16:creationId xmlns:a16="http://schemas.microsoft.com/office/drawing/2014/main" id="{E727FDFB-C64A-45EB-A170-E7CDF9463EA6}"/>
+              </a:ext>
+            </a:extLst>
+          </p:cNvPr>
+          <p:cNvCxnSpPr>
+            <a:cxnSpLocks/>
+            <a:endCxn id="7" idx="1"/>
+          </p:cNvCxnSpPr>
+          <p:nvPr/>
+        </p:nvCxnSpPr>
+        <p:spPr>
+          <a:xfrm>
+            <a:off x="6232844" y="1587876"/>
+            <a:ext cx="1590148" cy="3934"/>
+          </a:xfrm>
+          <a:prstGeom prst="straightConnector1">
+            <a:avLst/>
+          </a:prstGeom>
+          <a:ln w="76200">
+            <a:solidFill>
+              <a:schemeClr val="tx1"/>
+            </a:solidFill>
+            <a:headEnd type="triangle"/>
+            <a:tailEnd type="triangle"/>
+          </a:ln>
+        </p:spPr>
+        <p:style>
+          <a:lnRef idx="1">
+            <a:schemeClr val="dk1"/>
+          </a:lnRef>
+          <a:fillRef idx="0">
+            <a:schemeClr val="dk1"/>
+          </a:fillRef>
+          <a:effectRef idx="0">
+            <a:schemeClr val="dk1"/>
+          </a:effectRef>
+          <a:fontRef idx="minor">
+            <a:schemeClr val="tx1"/>
+          </a:fontRef>
+        </p:style>
+      </p:cxnSp>
+      <p:pic>
+        <p:nvPicPr>
+          <p:cNvPr id="26" name="그림 25">
+            <a:extLst>
+              <a:ext uri="{FF2B5EF4-FFF2-40B4-BE49-F238E27FC236}">
+                <a16:creationId xmlns:a16="http://schemas.microsoft.com/office/drawing/2014/main" id="{E809956C-A508-42E8-BF99-C455B691C08A}"/>
+              </a:ext>
+            </a:extLst>
+          </p:cNvPr>
+          <p:cNvPicPr>
+            <a:picLocks noChangeAspect="1"/>
+          </p:cNvPicPr>
+          <p:nvPr/>
+        </p:nvPicPr>
+        <p:blipFill>
+          <a:blip r:embed="rId5">
+            <a:extLst>
+              <a:ext uri="{28A0092B-C50C-407E-A947-70E740481C1C}">
+                <a14:useLocalDpi xmlns:a14="http://schemas.microsoft.com/office/drawing/2010/main" val="0"/>
+              </a:ext>
+            </a:extLst>
+          </a:blip>
+          <a:stretch>
+            <a:fillRect/>
+          </a:stretch>
+        </p:blipFill>
+        <p:spPr>
+          <a:xfrm>
+            <a:off x="810728" y="873502"/>
+            <a:ext cx="1428750" cy="1428750"/>
+          </a:xfrm>
+          <a:prstGeom prst="rect">
+            <a:avLst/>
+          </a:prstGeom>
+        </p:spPr>
+      </p:pic>
+      <p:sp>
+        <p:nvSpPr>
+          <p:cNvPr id="28" name="TextBox 27">
+            <a:extLst>
+              <a:ext uri="{FF2B5EF4-FFF2-40B4-BE49-F238E27FC236}">
+                <a16:creationId xmlns:a16="http://schemas.microsoft.com/office/drawing/2014/main" id="{ED8E942D-B134-4CE4-8CAC-76F3EB06188C}"/>
+              </a:ext>
+            </a:extLst>
+          </p:cNvPr>
+          <p:cNvSpPr txBox="1"/>
+          <p:nvPr/>
+        </p:nvSpPr>
+        <p:spPr>
+          <a:xfrm>
+            <a:off x="744927" y="2302252"/>
+            <a:ext cx="1560352" cy="369332"/>
+          </a:xfrm>
+          <a:prstGeom prst="rect">
+            <a:avLst/>
+          </a:prstGeom>
+          <a:noFill/>
+        </p:spPr>
+        <p:txBody>
+          <a:bodyPr wrap="square" rtlCol="0">
+            <a:spAutoFit/>
+          </a:bodyPr>
+          <a:lstStyle/>
+          <a:p>
+            <a:pPr algn="ctr"/>
+            <a:r>
+              <a:rPr lang="en-US" altLang="ko-KR" dirty="0"/>
+              <a:t>Sensor</a:t>
+            </a:r>
+            <a:endParaRPr lang="ko-KR" altLang="en-US" dirty="0"/>
+          </a:p>
+        </p:txBody>
+      </p:sp>
+      <p:cxnSp>
+        <p:nvCxnSpPr>
+          <p:cNvPr id="30" name="직선 화살표 연결선 29">
+            <a:extLst>
+              <a:ext uri="{FF2B5EF4-FFF2-40B4-BE49-F238E27FC236}">
+                <a16:creationId xmlns:a16="http://schemas.microsoft.com/office/drawing/2014/main" id="{169902AA-6DC5-47C3-9D00-B87BC45B6092}"/>
+              </a:ext>
+            </a:extLst>
+          </p:cNvPr>
+          <p:cNvCxnSpPr>
+            <a:cxnSpLocks/>
+            <a:stCxn id="26" idx="3"/>
+            <a:endCxn id="5" idx="1"/>
+          </p:cNvCxnSpPr>
+          <p:nvPr/>
+        </p:nvCxnSpPr>
+        <p:spPr>
+          <a:xfrm>
+            <a:off x="2239478" y="1587877"/>
+            <a:ext cx="1214876" cy="0"/>
+          </a:xfrm>
+          <a:prstGeom prst="straightConnector1">
+            <a:avLst/>
+          </a:prstGeom>
+          <a:ln w="76200">
+            <a:solidFill>
+              <a:schemeClr val="tx1"/>
+            </a:solidFill>
+            <a:headEnd type="triangle"/>
+            <a:tailEnd type="triangle"/>
+          </a:ln>
+        </p:spPr>
+        <p:style>
+          <a:lnRef idx="1">
+            <a:schemeClr val="dk1"/>
+          </a:lnRef>
+          <a:fillRef idx="0">
+            <a:schemeClr val="dk1"/>
+          </a:fillRef>
+          <a:effectRef idx="0">
+            <a:schemeClr val="dk1"/>
+          </a:effectRef>
+          <a:fontRef idx="minor">
+            <a:schemeClr val="tx1"/>
+          </a:fontRef>
+        </p:style>
+      </p:cxnSp>
+      <p:sp>
+        <p:nvSpPr>
+          <p:cNvPr id="34" name="TextBox 33">
+            <a:extLst>
+              <a:ext uri="{FF2B5EF4-FFF2-40B4-BE49-F238E27FC236}">
+                <a16:creationId xmlns:a16="http://schemas.microsoft.com/office/drawing/2014/main" id="{70366B71-0971-4D83-ACFE-1D6E77E750F4}"/>
+              </a:ext>
+            </a:extLst>
+          </p:cNvPr>
+          <p:cNvSpPr txBox="1"/>
+          <p:nvPr/>
+        </p:nvSpPr>
+        <p:spPr>
+          <a:xfrm>
+            <a:off x="7934036" y="5795899"/>
+            <a:ext cx="3648364" cy="292388"/>
+          </a:xfrm>
+          <a:prstGeom prst="rect">
+            <a:avLst/>
+          </a:prstGeom>
+          <a:noFill/>
+        </p:spPr>
+        <p:txBody>
+          <a:bodyPr wrap="square" rtlCol="0">
+            <a:spAutoFit/>
+          </a:bodyPr>
+          <a:lstStyle/>
+          <a:p>
+            <a:pPr algn="ctr"/>
+            <a:r>
+              <a:rPr lang="ko-KR" altLang="en-US" sz="1300" dirty="0"/>
+              <a:t>아이콘 출처 </a:t>
+            </a:r>
+            <a:r>
+              <a:rPr lang="en-US" altLang="ko-KR" sz="1300" dirty="0"/>
+              <a:t>: ICONS8</a:t>
+            </a:r>
+            <a:endParaRPr lang="ko-KR" altLang="en-US" sz="1300" dirty="0"/>
+          </a:p>
+        </p:txBody>
+      </p:sp>
+    </p:spTree>
+    <p:extLst>
+      <p:ext uri="{BB962C8B-B14F-4D97-AF65-F5344CB8AC3E}">
+        <p14:creationId xmlns:p14="http://schemas.microsoft.com/office/powerpoint/2010/main" val="2332854449"/>
+      </p:ext>
+    </p:extLst>
+  </p:cSld>
+  <p:clrMapOvr>
+    <a:masterClrMapping/>
+  </p:clrMapOvr>
+</p:sld>
+</file>
+
+<file path=ppt/slides/slide3.xml><?xml version="1.0" encoding="utf-8"?>
+<p:sld xmlns:a="http://schemas.openxmlformats.org/drawingml/2006/main" xmlns:r="http://schemas.openxmlformats.org/officeDocument/2006/relationships" xmlns:p="http://schemas.openxmlformats.org/presentationml/2006/main">
+  <p:cSld>
+    <p:spTree>
+      <p:nvGrpSpPr>
+        <p:cNvPr id="1" name=""/>
+        <p:cNvGrpSpPr/>
+        <p:nvPr/>
+      </p:nvGrpSpPr>
+      <p:grpSpPr>
+        <a:xfrm>
+          <a:off x="0" y="0"/>
+          <a:ext cx="0" cy="0"/>
+          <a:chOff x="0" y="0"/>
+          <a:chExt cx="0" cy="0"/>
+        </a:xfrm>
+      </p:grpSpPr>
+      <p:sp>
+        <p:nvSpPr>
+          <p:cNvPr id="194" name="직사각형 193">
+            <a:extLst>
+              <a:ext uri="{FF2B5EF4-FFF2-40B4-BE49-F238E27FC236}">
+                <a16:creationId xmlns:a16="http://schemas.microsoft.com/office/drawing/2014/main" id="{EDD7A9F2-DFA2-4BC7-A239-2E491AD10BCF}"/>
+              </a:ext>
+            </a:extLst>
+          </p:cNvPr>
+          <p:cNvSpPr/>
+          <p:nvPr/>
+        </p:nvSpPr>
+        <p:spPr>
+          <a:xfrm>
+            <a:off x="2927758" y="100668"/>
+            <a:ext cx="5595457" cy="6238300"/>
+          </a:xfrm>
+          <a:prstGeom prst="rect">
+            <a:avLst/>
+          </a:prstGeom>
+          <a:noFill/>
+          <a:ln w="57150">
+            <a:solidFill>
+              <a:schemeClr val="accent1"/>
+            </a:solidFill>
+          </a:ln>
+        </p:spPr>
+        <p:style>
+          <a:lnRef idx="2">
+            <a:schemeClr val="accent1">
+              <a:shade val="50000"/>
+            </a:schemeClr>
+          </a:lnRef>
+          <a:fillRef idx="1">
+            <a:schemeClr val="accent1"/>
+          </a:fillRef>
+          <a:effectRef idx="0">
+            <a:schemeClr val="accent1"/>
+          </a:effectRef>
+          <a:fontRef idx="minor">
+            <a:schemeClr val="lt1"/>
+          </a:fontRef>
+        </p:style>
+        <p:txBody>
+          <a:bodyPr rtlCol="0" anchor="ctr"/>
+          <a:lstStyle/>
+          <a:p>
+            <a:pPr algn="ctr"/>
+            <a:endParaRPr lang="ko-KR" altLang="en-US"/>
+          </a:p>
+        </p:txBody>
+      </p:sp>
+      <p:sp>
+        <p:nvSpPr>
+          <p:cNvPr id="202" name="직사각형 201">
+            <a:extLst>
+              <a:ext uri="{FF2B5EF4-FFF2-40B4-BE49-F238E27FC236}">
+                <a16:creationId xmlns:a16="http://schemas.microsoft.com/office/drawing/2014/main" id="{2338A5D0-64D3-4AF4-A90B-B04011F7FACC}"/>
+              </a:ext>
+            </a:extLst>
+          </p:cNvPr>
+          <p:cNvSpPr/>
+          <p:nvPr/>
+        </p:nvSpPr>
+        <p:spPr>
+          <a:xfrm>
+            <a:off x="803550" y="100668"/>
+            <a:ext cx="1980309" cy="6238300"/>
+          </a:xfrm>
+          <a:prstGeom prst="rect">
+            <a:avLst/>
+          </a:prstGeom>
+          <a:noFill/>
+          <a:ln w="57150">
+            <a:solidFill>
+              <a:schemeClr val="accent5">
+                <a:lumMod val="60000"/>
+                <a:lumOff val="40000"/>
+              </a:schemeClr>
+            </a:solidFill>
+          </a:ln>
+        </p:spPr>
+        <p:style>
+          <a:lnRef idx="2">
+            <a:schemeClr val="accent1">
+              <a:shade val="50000"/>
+            </a:schemeClr>
+          </a:lnRef>
+          <a:fillRef idx="1">
+            <a:schemeClr val="accent1"/>
+          </a:fillRef>
+          <a:effectRef idx="0">
+            <a:schemeClr val="accent1"/>
+          </a:effectRef>
+          <a:fontRef idx="minor">
+            <a:schemeClr val="lt1"/>
+          </a:fontRef>
+        </p:style>
+        <p:txBody>
+          <a:bodyPr rtlCol="0" anchor="ctr"/>
+          <a:lstStyle/>
+          <a:p>
+            <a:pPr algn="ctr"/>
+            <a:endParaRPr lang="ko-KR" altLang="en-US"/>
+          </a:p>
+        </p:txBody>
+      </p:sp>
+      <p:sp>
+        <p:nvSpPr>
+          <p:cNvPr id="204" name="직사각형 203">
+            <a:extLst>
+              <a:ext uri="{FF2B5EF4-FFF2-40B4-BE49-F238E27FC236}">
+                <a16:creationId xmlns:a16="http://schemas.microsoft.com/office/drawing/2014/main" id="{EBC629DC-054F-4117-8E07-601E104C775D}"/>
+              </a:ext>
+            </a:extLst>
+          </p:cNvPr>
+          <p:cNvSpPr/>
+          <p:nvPr/>
+        </p:nvSpPr>
+        <p:spPr>
+          <a:xfrm>
+            <a:off x="8690609" y="102066"/>
+            <a:ext cx="1807788" cy="6238300"/>
+          </a:xfrm>
+          <a:prstGeom prst="rect">
+            <a:avLst/>
+          </a:prstGeom>
+          <a:noFill/>
+          <a:ln w="57150">
+            <a:solidFill>
+              <a:schemeClr val="accent5">
+                <a:lumMod val="60000"/>
+                <a:lumOff val="40000"/>
+              </a:schemeClr>
+            </a:solidFill>
+          </a:ln>
+        </p:spPr>
+        <p:style>
+          <a:lnRef idx="2">
+            <a:schemeClr val="accent1">
+              <a:shade val="50000"/>
+            </a:schemeClr>
+          </a:lnRef>
+          <a:fillRef idx="1">
+            <a:schemeClr val="accent1"/>
+          </a:fillRef>
+          <a:effectRef idx="0">
+            <a:schemeClr val="accent1"/>
+          </a:effectRef>
+          <a:fontRef idx="minor">
+            <a:schemeClr val="lt1"/>
+          </a:fontRef>
+        </p:style>
+        <p:txBody>
+          <a:bodyPr rtlCol="0" anchor="ctr"/>
+          <a:lstStyle/>
+          <a:p>
+            <a:pPr algn="ctr"/>
+            <a:endParaRPr lang="ko-KR" altLang="en-US"/>
+          </a:p>
+        </p:txBody>
+      </p:sp>
       <p:grpSp>
         <p:nvGrpSpPr>
           <p:cNvPr id="24" name="그룹 23">
@@ -7558,58 +8239,6 @@
       </p:cxnSp>
       <p:sp>
         <p:nvSpPr>
-          <p:cNvPr id="194" name="직사각형 193">
-            <a:extLst>
-              <a:ext uri="{FF2B5EF4-FFF2-40B4-BE49-F238E27FC236}">
-                <a16:creationId xmlns:a16="http://schemas.microsoft.com/office/drawing/2014/main" id="{EDD7A9F2-DFA2-4BC7-A239-2E491AD10BCF}"/>
-              </a:ext>
-            </a:extLst>
-          </p:cNvPr>
-          <p:cNvSpPr/>
-          <p:nvPr/>
-        </p:nvSpPr>
-        <p:spPr>
-          <a:xfrm>
-            <a:off x="2927758" y="100668"/>
-            <a:ext cx="5595457" cy="6238300"/>
-          </a:xfrm>
-          <a:prstGeom prst="rect">
-            <a:avLst/>
-          </a:prstGeom>
-          <a:noFill/>
-          <a:ln w="57150">
-            <a:solidFill>
-              <a:schemeClr val="accent1"/>
-            </a:solidFill>
-          </a:ln>
-        </p:spPr>
-        <p:style>
-          <a:lnRef idx="2">
-            <a:schemeClr val="accent1">
-              <a:shade val="50000"/>
-            </a:schemeClr>
-          </a:lnRef>
-          <a:fillRef idx="1">
-            <a:schemeClr val="accent1"/>
-          </a:fillRef>
-          <a:effectRef idx="0">
-            <a:schemeClr val="accent1"/>
-          </a:effectRef>
-          <a:fontRef idx="minor">
-            <a:schemeClr val="lt1"/>
-          </a:fontRef>
-        </p:style>
-        <p:txBody>
-          <a:bodyPr rtlCol="0" anchor="ctr"/>
-          <a:lstStyle/>
-          <a:p>
-            <a:pPr algn="ctr"/>
-            <a:endParaRPr lang="ko-KR" altLang="en-US"/>
-          </a:p>
-        </p:txBody>
-      </p:sp>
-      <p:sp>
-        <p:nvSpPr>
           <p:cNvPr id="195" name="TextBox 194">
             <a:extLst>
               <a:ext uri="{FF2B5EF4-FFF2-40B4-BE49-F238E27FC236}">
@@ -7647,61 +8276,6 @@
       </p:sp>
       <p:sp>
         <p:nvSpPr>
-          <p:cNvPr id="202" name="직사각형 201">
-            <a:extLst>
-              <a:ext uri="{FF2B5EF4-FFF2-40B4-BE49-F238E27FC236}">
-                <a16:creationId xmlns:a16="http://schemas.microsoft.com/office/drawing/2014/main" id="{2338A5D0-64D3-4AF4-A90B-B04011F7FACC}"/>
-              </a:ext>
-            </a:extLst>
-          </p:cNvPr>
-          <p:cNvSpPr/>
-          <p:nvPr/>
-        </p:nvSpPr>
-        <p:spPr>
-          <a:xfrm>
-            <a:off x="803550" y="100668"/>
-            <a:ext cx="1980309" cy="6238300"/>
-          </a:xfrm>
-          <a:prstGeom prst="rect">
-            <a:avLst/>
-          </a:prstGeom>
-          <a:noFill/>
-          <a:ln w="57150">
-            <a:solidFill>
-              <a:schemeClr val="accent5">
-                <a:lumMod val="60000"/>
-                <a:lumOff val="40000"/>
-              </a:schemeClr>
-            </a:solidFill>
-          </a:ln>
-        </p:spPr>
-        <p:style>
-          <a:lnRef idx="2">
-            <a:schemeClr val="accent1">
-              <a:shade val="50000"/>
-            </a:schemeClr>
-          </a:lnRef>
-          <a:fillRef idx="1">
-            <a:schemeClr val="accent1"/>
-          </a:fillRef>
-          <a:effectRef idx="0">
-            <a:schemeClr val="accent1"/>
-          </a:effectRef>
-          <a:fontRef idx="minor">
-            <a:schemeClr val="lt1"/>
-          </a:fontRef>
-        </p:style>
-        <p:txBody>
-          <a:bodyPr rtlCol="0" anchor="ctr"/>
-          <a:lstStyle/>
-          <a:p>
-            <a:pPr algn="ctr"/>
-            <a:endParaRPr lang="ko-KR" altLang="en-US"/>
-          </a:p>
-        </p:txBody>
-      </p:sp>
-      <p:sp>
-        <p:nvSpPr>
           <p:cNvPr id="203" name="TextBox 202">
             <a:extLst>
               <a:ext uri="{FF2B5EF4-FFF2-40B4-BE49-F238E27FC236}">
@@ -7734,61 +8308,6 @@
               <a:t>라즈베리파이</a:t>
             </a:r>
             <a:endParaRPr lang="ko-KR" altLang="en-US" dirty="0"/>
-          </a:p>
-        </p:txBody>
-      </p:sp>
-      <p:sp>
-        <p:nvSpPr>
-          <p:cNvPr id="204" name="직사각형 203">
-            <a:extLst>
-              <a:ext uri="{FF2B5EF4-FFF2-40B4-BE49-F238E27FC236}">
-                <a16:creationId xmlns:a16="http://schemas.microsoft.com/office/drawing/2014/main" id="{EBC629DC-054F-4117-8E07-601E104C775D}"/>
-              </a:ext>
-            </a:extLst>
-          </p:cNvPr>
-          <p:cNvSpPr/>
-          <p:nvPr/>
-        </p:nvSpPr>
-        <p:spPr>
-          <a:xfrm>
-            <a:off x="8690609" y="102066"/>
-            <a:ext cx="1807788" cy="6238300"/>
-          </a:xfrm>
-          <a:prstGeom prst="rect">
-            <a:avLst/>
-          </a:prstGeom>
-          <a:noFill/>
-          <a:ln w="57150">
-            <a:solidFill>
-              <a:schemeClr val="accent5">
-                <a:lumMod val="60000"/>
-                <a:lumOff val="40000"/>
-              </a:schemeClr>
-            </a:solidFill>
-          </a:ln>
-        </p:spPr>
-        <p:style>
-          <a:lnRef idx="2">
-            <a:schemeClr val="accent1">
-              <a:shade val="50000"/>
-            </a:schemeClr>
-          </a:lnRef>
-          <a:fillRef idx="1">
-            <a:schemeClr val="accent1"/>
-          </a:fillRef>
-          <a:effectRef idx="0">
-            <a:schemeClr val="accent1"/>
-          </a:effectRef>
-          <a:fontRef idx="minor">
-            <a:schemeClr val="lt1"/>
-          </a:fontRef>
-        </p:style>
-        <p:txBody>
-          <a:bodyPr rtlCol="0" anchor="ctr"/>
-          <a:lstStyle/>
-          <a:p>
-            <a:pPr algn="ctr"/>
-            <a:endParaRPr lang="ko-KR" altLang="en-US"/>
           </a:p>
         </p:txBody>
       </p:sp>
@@ -7841,7 +8360,7 @@
 </p:sld>
 </file>
 
-<file path=ppt/slides/slide3.xml><?xml version="1.0" encoding="utf-8"?>
+<file path=ppt/slides/slide4.xml><?xml version="1.0" encoding="utf-8"?>
 <p:sld xmlns:a="http://schemas.openxmlformats.org/drawingml/2006/main" xmlns:r="http://schemas.openxmlformats.org/officeDocument/2006/relationships" xmlns:p="http://schemas.openxmlformats.org/presentationml/2006/main">
   <p:cSld>
     <p:spTree>
@@ -9660,7 +10179,23 @@
           <a:p>
             <a:r>
               <a:rPr lang="en-US" altLang="ko-KR" sz="1000" dirty="0"/>
-              <a:t>temp, moist, tret1, tret2, </a:t>
+              <a:t>moist, temp, tret1, tret2, </a:t>
+            </a:r>
+            <a:r>
+              <a:rPr lang="en-US" altLang="ko-KR" sz="1000" dirty="0" err="1"/>
+              <a:t>set_temp</a:t>
+            </a:r>
+            <a:r>
+              <a:rPr lang="en-US" altLang="ko-KR" sz="1000" dirty="0"/>
+              <a:t>, </a:t>
+            </a:r>
+            <a:r>
+              <a:rPr lang="en-US" altLang="ko-KR" sz="1000" dirty="0" err="1"/>
+              <a:t>set_moist</a:t>
+            </a:r>
+            <a:r>
+              <a:rPr lang="en-US" altLang="ko-KR" sz="1000" dirty="0"/>
+              <a:t>, </a:t>
             </a:r>
             <a:r>
               <a:rPr lang="en-US" altLang="ko-KR" sz="1000" dirty="0" err="1"/>
@@ -9676,23 +10211,13 @@
             </a:r>
             <a:r>
               <a:rPr lang="en-US" altLang="ko-KR" sz="1000" dirty="0"/>
-              <a:t>,</a:t>
-            </a:r>
-            <a:r>
-              <a:rPr lang="ko-KR" altLang="en-US" sz="1000" dirty="0"/>
-              <a:t> </a:t>
+              <a:t>, </a:t>
+            </a:r>
+            <a:r>
+              <a:rPr lang="en-US" altLang="ko-KR" sz="1000" dirty="0" err="1"/>
+              <a:t>food_empty</a:t>
             </a:r>
             <a:endParaRPr lang="en-US" altLang="ko-KR" sz="1000" dirty="0"/>
-          </a:p>
-          <a:p>
-            <a:r>
-              <a:rPr lang="en-US" altLang="ko-KR" sz="1000" dirty="0" err="1"/>
-              <a:t>pi_server_status</a:t>
-            </a:r>
-            <a:r>
-              <a:rPr lang="en-US" altLang="ko-KR" sz="1000" dirty="0"/>
-              <a:t>(1)</a:t>
-            </a:r>
           </a:p>
         </p:txBody>
       </p:sp>
@@ -10103,7 +10628,7 @@
 </p:sld>
 </file>
 
-<file path=ppt/slides/slide4.xml><?xml version="1.0" encoding="utf-8"?>
+<file path=ppt/slides/slide5.xml><?xml version="1.0" encoding="utf-8"?>
 <p:sld xmlns:a="http://schemas.openxmlformats.org/drawingml/2006/main" xmlns:r="http://schemas.openxmlformats.org/officeDocument/2006/relationships" xmlns:p="http://schemas.openxmlformats.org/presentationml/2006/main">
   <p:cSld>
     <p:spTree>
@@ -12370,7 +12895,7 @@
 </p:sld>
 </file>
 
-<file path=ppt/slides/slide5.xml><?xml version="1.0" encoding="utf-8"?>
+<file path=ppt/slides/slide6.xml><?xml version="1.0" encoding="utf-8"?>
 <p:sld xmlns:a="http://schemas.openxmlformats.org/drawingml/2006/main" xmlns:r="http://schemas.openxmlformats.org/officeDocument/2006/relationships" xmlns:p="http://schemas.openxmlformats.org/presentationml/2006/main">
   <p:cSld>
     <p:bg>
@@ -12395,6 +12920,35 @@
           <a:chExt cx="0" cy="0"/>
         </a:xfrm>
       </p:grpSpPr>
+      <p:pic>
+        <p:nvPicPr>
+          <p:cNvPr id="3" name="그림 2">
+            <a:extLst>
+              <a:ext uri="{FF2B5EF4-FFF2-40B4-BE49-F238E27FC236}">
+                <a16:creationId xmlns:a16="http://schemas.microsoft.com/office/drawing/2014/main" id="{178AE4C2-924B-4A1D-B510-D738633BCC5C}"/>
+              </a:ext>
+            </a:extLst>
+          </p:cNvPr>
+          <p:cNvPicPr>
+            <a:picLocks noChangeAspect="1"/>
+          </p:cNvPicPr>
+          <p:nvPr/>
+        </p:nvPicPr>
+        <p:blipFill rotWithShape="1">
+          <a:blip r:embed="rId2"/>
+          <a:srcRect l="653" t="1316"/>
+          <a:stretch/>
+        </p:blipFill>
+        <p:spPr>
+          <a:xfrm>
+            <a:off x="1541417" y="822959"/>
+            <a:ext cx="9169445" cy="5282565"/>
+          </a:xfrm>
+          <a:prstGeom prst="rect">
+            <a:avLst/>
+          </a:prstGeom>
+        </p:spPr>
+      </p:pic>
       <p:sp>
         <p:nvSpPr>
           <p:cNvPr id="12" name="Rectangle 11">
@@ -12550,35 +13104,6 @@
           </a:p>
         </p:txBody>
       </p:sp>
-      <p:pic>
-        <p:nvPicPr>
-          <p:cNvPr id="7" name="그림 6">
-            <a:extLst>
-              <a:ext uri="{FF2B5EF4-FFF2-40B4-BE49-F238E27FC236}">
-                <a16:creationId xmlns:a16="http://schemas.microsoft.com/office/drawing/2014/main" id="{2279FEFC-E148-4C42-A51C-CB507475731C}"/>
-              </a:ext>
-            </a:extLst>
-          </p:cNvPr>
-          <p:cNvPicPr>
-            <a:picLocks noChangeAspect="1"/>
-          </p:cNvPicPr>
-          <p:nvPr/>
-        </p:nvPicPr>
-        <p:blipFill rotWithShape="1">
-          <a:blip r:embed="rId2"/>
-          <a:srcRect b="2192"/>
-          <a:stretch/>
-        </p:blipFill>
-        <p:spPr>
-          <a:xfrm>
-            <a:off x="1588189" y="1083019"/>
-            <a:ext cx="8422085" cy="4971771"/>
-          </a:xfrm>
-          <a:prstGeom prst="rect">
-            <a:avLst/>
-          </a:prstGeom>
-        </p:spPr>
-      </p:pic>
       <p:sp>
         <p:nvSpPr>
           <p:cNvPr id="8" name="TextBox 7">
@@ -12593,8 +13118,8 @@
         </p:nvSpPr>
         <p:spPr>
           <a:xfrm>
-            <a:off x="5145404" y="2419775"/>
-            <a:ext cx="2083361" cy="323165"/>
+            <a:off x="4855983" y="2231917"/>
+            <a:ext cx="2924176" cy="292388"/>
           </a:xfrm>
           <a:prstGeom prst="rect">
             <a:avLst/>
@@ -12608,10 +13133,22 @@
           <a:lstStyle/>
           <a:p>
             <a:r>
-              <a:rPr lang="en-US" altLang="ko-KR" sz="1500" dirty="0"/>
-              <a:t>Protocol </a:t>
-            </a:r>
-            <a:endParaRPr lang="ko-KR" altLang="en-US" sz="1500" dirty="0"/>
+              <a:rPr lang="en-US" altLang="ko-KR" sz="1300" dirty="0" err="1"/>
+              <a:t>tbServerLog</a:t>
+            </a:r>
+            <a:r>
+              <a:rPr lang="en-US" altLang="ko-KR" sz="1300" dirty="0"/>
+              <a:t> : Protocol </a:t>
+            </a:r>
+            <a:r>
+              <a:rPr lang="ko-KR" altLang="en-US" sz="1300" dirty="0"/>
+              <a:t>확인 </a:t>
+            </a:r>
+            <a:r>
+              <a:rPr lang="en-US" altLang="ko-KR" sz="1300" dirty="0"/>
+              <a:t>textbox</a:t>
+            </a:r>
+            <a:endParaRPr lang="ko-KR" altLang="en-US" sz="1300" dirty="0"/>
           </a:p>
         </p:txBody>
       </p:sp>
@@ -12629,8 +13166,8 @@
         </p:nvSpPr>
         <p:spPr>
           <a:xfrm>
-            <a:off x="4991270" y="4603054"/>
-            <a:ext cx="1778646" cy="323165"/>
+            <a:off x="4907641" y="4235782"/>
+            <a:ext cx="2376717" cy="292388"/>
           </a:xfrm>
           <a:prstGeom prst="rect">
             <a:avLst/>
@@ -12644,14 +13181,22 @@
           <a:lstStyle/>
           <a:p>
             <a:r>
-              <a:rPr lang="ko-KR" altLang="en-US" sz="1500" dirty="0"/>
+              <a:rPr lang="en-US" altLang="ko-KR" sz="1300" dirty="0" err="1"/>
+              <a:t>tbServer</a:t>
+            </a:r>
+            <a:r>
+              <a:rPr lang="en-US" altLang="ko-KR" sz="1300" dirty="0"/>
+              <a:t> : </a:t>
+            </a:r>
+            <a:r>
+              <a:rPr lang="ko-KR" altLang="en-US" sz="1300" dirty="0"/>
               <a:t>서버 기록 </a:t>
             </a:r>
             <a:r>
-              <a:rPr lang="en-US" altLang="ko-KR" sz="1500" dirty="0"/>
+              <a:rPr lang="en-US" altLang="ko-KR" sz="1300" dirty="0"/>
               <a:t>textbox</a:t>
             </a:r>
-            <a:endParaRPr lang="ko-KR" altLang="en-US" sz="1500" dirty="0"/>
+            <a:endParaRPr lang="ko-KR" altLang="en-US" sz="1300" dirty="0"/>
           </a:p>
         </p:txBody>
       </p:sp>
@@ -12669,8 +13214,8 @@
         </p:nvSpPr>
         <p:spPr>
           <a:xfrm>
-            <a:off x="2751754" y="4926219"/>
-            <a:ext cx="1130334" cy="323165"/>
+            <a:off x="1769393" y="3721631"/>
+            <a:ext cx="1403455" cy="292388"/>
           </a:xfrm>
           <a:prstGeom prst="rect">
             <a:avLst/>
@@ -12684,13 +13229,235 @@
           <a:lstStyle/>
           <a:p>
             <a:r>
-              <a:rPr lang="en-US" altLang="ko-KR" sz="1500" dirty="0" err="1"/>
-              <a:t>fff</a:t>
-            </a:r>
-            <a:endParaRPr lang="ko-KR" altLang="en-US" sz="1500" dirty="0"/>
-          </a:p>
-        </p:txBody>
-      </p:sp>
+              <a:rPr lang="ko-KR" altLang="en-US" sz="1300" dirty="0"/>
+              <a:t>최근 연결 </a:t>
+            </a:r>
+            <a:r>
+              <a:rPr lang="en-US" altLang="ko-KR" sz="1300" dirty="0"/>
+              <a:t>IP</a:t>
+            </a:r>
+            <a:endParaRPr lang="ko-KR" altLang="en-US" sz="1300" dirty="0"/>
+          </a:p>
+        </p:txBody>
+      </p:sp>
+      <p:cxnSp>
+        <p:nvCxnSpPr>
+          <p:cNvPr id="15" name="직선 화살표 연결선 14">
+            <a:extLst>
+              <a:ext uri="{FF2B5EF4-FFF2-40B4-BE49-F238E27FC236}">
+                <a16:creationId xmlns:a16="http://schemas.microsoft.com/office/drawing/2014/main" id="{31D60B32-FFEB-48EB-9F9F-BAD43F7ACC5F}"/>
+              </a:ext>
+            </a:extLst>
+          </p:cNvPr>
+          <p:cNvCxnSpPr>
+            <a:cxnSpLocks/>
+          </p:cNvCxnSpPr>
+          <p:nvPr/>
+        </p:nvCxnSpPr>
+        <p:spPr>
+          <a:xfrm flipH="1">
+            <a:off x="2119745" y="4044796"/>
+            <a:ext cx="235689" cy="1592339"/>
+          </a:xfrm>
+          <a:prstGeom prst="straightConnector1">
+            <a:avLst/>
+          </a:prstGeom>
+          <a:ln w="19050">
+            <a:solidFill>
+              <a:schemeClr val="tx1"/>
+            </a:solidFill>
+            <a:tailEnd type="triangle"/>
+          </a:ln>
+        </p:spPr>
+        <p:style>
+          <a:lnRef idx="1">
+            <a:schemeClr val="dk1"/>
+          </a:lnRef>
+          <a:fillRef idx="0">
+            <a:schemeClr val="dk1"/>
+          </a:fillRef>
+          <a:effectRef idx="0">
+            <a:schemeClr val="dk1"/>
+          </a:effectRef>
+          <a:fontRef idx="minor">
+            <a:schemeClr val="tx1"/>
+          </a:fontRef>
+        </p:style>
+      </p:cxnSp>
+      <p:sp>
+        <p:nvSpPr>
+          <p:cNvPr id="17" name="TextBox 16">
+            <a:extLst>
+              <a:ext uri="{FF2B5EF4-FFF2-40B4-BE49-F238E27FC236}">
+                <a16:creationId xmlns:a16="http://schemas.microsoft.com/office/drawing/2014/main" id="{031C2373-B360-4515-AD1A-B2AF558312D2}"/>
+              </a:ext>
+            </a:extLst>
+          </p:cNvPr>
+          <p:cNvSpPr txBox="1"/>
+          <p:nvPr/>
+        </p:nvSpPr>
+        <p:spPr>
+          <a:xfrm>
+            <a:off x="2396153" y="4235782"/>
+            <a:ext cx="1671021" cy="492443"/>
+          </a:xfrm>
+          <a:prstGeom prst="rect">
+            <a:avLst/>
+          </a:prstGeom>
+          <a:noFill/>
+        </p:spPr>
+        <p:txBody>
+          <a:bodyPr wrap="square" rtlCol="0">
+            <a:spAutoFit/>
+          </a:bodyPr>
+          <a:lstStyle/>
+          <a:p>
+            <a:r>
+              <a:rPr lang="ko-KR" altLang="en-US" sz="1300" dirty="0"/>
+              <a:t>최근 연결 </a:t>
+            </a:r>
+            <a:endParaRPr lang="en-US" altLang="ko-KR" sz="1300" dirty="0"/>
+          </a:p>
+          <a:p>
+            <a:r>
+              <a:rPr lang="ko-KR" altLang="en-US" sz="1300" dirty="0"/>
+              <a:t>클라이언트 표시</a:t>
+            </a:r>
+          </a:p>
+        </p:txBody>
+      </p:sp>
+      <p:cxnSp>
+        <p:nvCxnSpPr>
+          <p:cNvPr id="18" name="직선 화살표 연결선 17">
+            <a:extLst>
+              <a:ext uri="{FF2B5EF4-FFF2-40B4-BE49-F238E27FC236}">
+                <a16:creationId xmlns:a16="http://schemas.microsoft.com/office/drawing/2014/main" id="{F563052B-2715-41C0-8F0E-7E2622D71600}"/>
+              </a:ext>
+            </a:extLst>
+          </p:cNvPr>
+          <p:cNvCxnSpPr>
+            <a:cxnSpLocks/>
+          </p:cNvCxnSpPr>
+          <p:nvPr/>
+        </p:nvCxnSpPr>
+        <p:spPr>
+          <a:xfrm flipH="1">
+            <a:off x="2607601" y="4728225"/>
+            <a:ext cx="341369" cy="908910"/>
+          </a:xfrm>
+          <a:prstGeom prst="straightConnector1">
+            <a:avLst/>
+          </a:prstGeom>
+          <a:ln w="19050">
+            <a:solidFill>
+              <a:schemeClr val="tx1"/>
+            </a:solidFill>
+            <a:tailEnd type="triangle"/>
+          </a:ln>
+        </p:spPr>
+        <p:style>
+          <a:lnRef idx="1">
+            <a:schemeClr val="dk1"/>
+          </a:lnRef>
+          <a:fillRef idx="0">
+            <a:schemeClr val="dk1"/>
+          </a:fillRef>
+          <a:effectRef idx="0">
+            <a:schemeClr val="dk1"/>
+          </a:effectRef>
+          <a:fontRef idx="minor">
+            <a:schemeClr val="tx1"/>
+          </a:fontRef>
+        </p:style>
+      </p:cxnSp>
+      <p:sp>
+        <p:nvSpPr>
+          <p:cNvPr id="13" name="TextBox 12">
+            <a:extLst>
+              <a:ext uri="{FF2B5EF4-FFF2-40B4-BE49-F238E27FC236}">
+                <a16:creationId xmlns:a16="http://schemas.microsoft.com/office/drawing/2014/main" id="{52CD5EF8-8C0A-4EA0-8381-8328C83A12E3}"/>
+              </a:ext>
+            </a:extLst>
+          </p:cNvPr>
+          <p:cNvSpPr txBox="1"/>
+          <p:nvPr/>
+        </p:nvSpPr>
+        <p:spPr>
+          <a:xfrm>
+            <a:off x="4449684" y="4942991"/>
+            <a:ext cx="1671021" cy="492443"/>
+          </a:xfrm>
+          <a:prstGeom prst="rect">
+            <a:avLst/>
+          </a:prstGeom>
+          <a:noFill/>
+        </p:spPr>
+        <p:txBody>
+          <a:bodyPr wrap="square" rtlCol="0">
+            <a:spAutoFit/>
+          </a:bodyPr>
+          <a:lstStyle/>
+          <a:p>
+            <a:r>
+              <a:rPr lang="ko-KR" altLang="en-US" sz="1300" dirty="0"/>
+              <a:t>사육장 적정 </a:t>
+            </a:r>
+            <a:r>
+              <a:rPr lang="ko-KR" altLang="en-US" sz="1300" dirty="0" err="1"/>
+              <a:t>온습도</a:t>
+            </a:r>
+            <a:r>
+              <a:rPr lang="ko-KR" altLang="en-US" sz="1300" dirty="0"/>
+              <a:t> 범위 설정</a:t>
+            </a:r>
+          </a:p>
+        </p:txBody>
+      </p:sp>
+      <p:cxnSp>
+        <p:nvCxnSpPr>
+          <p:cNvPr id="14" name="직선 화살표 연결선 13">
+            <a:extLst>
+              <a:ext uri="{FF2B5EF4-FFF2-40B4-BE49-F238E27FC236}">
+                <a16:creationId xmlns:a16="http://schemas.microsoft.com/office/drawing/2014/main" id="{D9B54E88-9022-45A8-A9CB-F8B83D5E5678}"/>
+              </a:ext>
+            </a:extLst>
+          </p:cNvPr>
+          <p:cNvCxnSpPr>
+            <a:cxnSpLocks/>
+            <a:stCxn id="13" idx="1"/>
+          </p:cNvCxnSpPr>
+          <p:nvPr/>
+        </p:nvCxnSpPr>
+        <p:spPr>
+          <a:xfrm flipH="1">
+            <a:off x="4026540" y="5189213"/>
+            <a:ext cx="423144" cy="501490"/>
+          </a:xfrm>
+          <a:prstGeom prst="straightConnector1">
+            <a:avLst/>
+          </a:prstGeom>
+          <a:ln w="19050">
+            <a:solidFill>
+              <a:schemeClr val="tx1"/>
+            </a:solidFill>
+            <a:tailEnd type="triangle"/>
+          </a:ln>
+        </p:spPr>
+        <p:style>
+          <a:lnRef idx="1">
+            <a:schemeClr val="dk1"/>
+          </a:lnRef>
+          <a:fillRef idx="0">
+            <a:schemeClr val="dk1"/>
+          </a:fillRef>
+          <a:effectRef idx="0">
+            <a:schemeClr val="dk1"/>
+          </a:effectRef>
+          <a:fontRef idx="minor">
+            <a:schemeClr val="tx1"/>
+          </a:fontRef>
+        </p:style>
+      </p:cxnSp>
     </p:spTree>
     <p:extLst>
       <p:ext uri="{BB962C8B-B14F-4D97-AF65-F5344CB8AC3E}">
@@ -12704,7 +13471,7 @@
 </p:sld>
 </file>
 
-<file path=ppt/slides/slide6.xml><?xml version="1.0" encoding="utf-8"?>
+<file path=ppt/slides/slide7.xml><?xml version="1.0" encoding="utf-8"?>
 <p:sld xmlns:a="http://schemas.openxmlformats.org/drawingml/2006/main" xmlns:r="http://schemas.openxmlformats.org/officeDocument/2006/relationships" xmlns:p="http://schemas.openxmlformats.org/presentationml/2006/main">
   <p:cSld>
     <p:bg>
@@ -12731,7 +13498,7 @@
       </p:grpSpPr>
       <p:sp>
         <p:nvSpPr>
-          <p:cNvPr id="10" name="Rectangle 9">
+          <p:cNvPr id="15" name="Rectangle 14">
             <a:extLst>
               <a:ext uri="{FF2B5EF4-FFF2-40B4-BE49-F238E27FC236}">
                 <a16:creationId xmlns:a16="http://schemas.microsoft.com/office/drawing/2014/main" id="{42A4FC2C-047E-45A5-965D-8E1E3BF09BC6}"/>
@@ -12886,10 +13653,10 @@
       </p:sp>
       <p:pic>
         <p:nvPicPr>
-          <p:cNvPr id="5" name="그림 4">
-            <a:extLst>
-              <a:ext uri="{FF2B5EF4-FFF2-40B4-BE49-F238E27FC236}">
-                <a16:creationId xmlns:a16="http://schemas.microsoft.com/office/drawing/2014/main" id="{9AC0EDA1-25DD-4A69-B6C0-3EC43839454D}"/>
+          <p:cNvPr id="4" name="그림 3" descr="텍스트이(가) 표시된 사진&#10;&#10;자동 생성된 설명">
+            <a:extLst>
+              <a:ext uri="{FF2B5EF4-FFF2-40B4-BE49-F238E27FC236}">
+                <a16:creationId xmlns:a16="http://schemas.microsoft.com/office/drawing/2014/main" id="{4520D144-0FE4-4212-8355-A0468C8B54F7}"/>
               </a:ext>
             </a:extLst>
           </p:cNvPr>
@@ -12900,13 +13667,13 @@
         </p:nvPicPr>
         <p:blipFill rotWithShape="1">
           <a:blip r:embed="rId2"/>
-          <a:srcRect t="-18" b="2616"/>
+          <a:srcRect b="2616"/>
           <a:stretch/>
         </p:blipFill>
         <p:spPr>
           <a:xfrm>
-            <a:off x="-1504" y="0"/>
-            <a:ext cx="12191980" cy="6858000"/>
+            <a:off x="20" y="1282"/>
+            <a:ext cx="12191980" cy="6856718"/>
           </a:xfrm>
           <a:prstGeom prst="rect">
             <a:avLst/>
@@ -12926,7 +13693,7 @@
 </p:sld>
 </file>
 
-<file path=ppt/slides/slide7.xml><?xml version="1.0" encoding="utf-8"?>
+<file path=ppt/slides/slide8.xml><?xml version="1.0" encoding="utf-8"?>
 <p:sld xmlns:a="http://schemas.openxmlformats.org/drawingml/2006/main" xmlns:r="http://schemas.openxmlformats.org/officeDocument/2006/relationships" xmlns:p="http://schemas.openxmlformats.org/presentationml/2006/main">
   <p:cSld>
     <p:bg>
@@ -12953,7 +13720,7 @@
       </p:grpSpPr>
       <p:sp>
         <p:nvSpPr>
-          <p:cNvPr id="10" name="Rectangle 9">
+          <p:cNvPr id="15" name="Rectangle 14">
             <a:extLst>
               <a:ext uri="{FF2B5EF4-FFF2-40B4-BE49-F238E27FC236}">
                 <a16:creationId xmlns:a16="http://schemas.microsoft.com/office/drawing/2014/main" id="{42A4FC2C-047E-45A5-965D-8E1E3BF09BC6}"/>
@@ -13108,10 +13875,10 @@
       </p:sp>
       <p:pic>
         <p:nvPicPr>
-          <p:cNvPr id="5" name="그림 4">
-            <a:extLst>
-              <a:ext uri="{FF2B5EF4-FFF2-40B4-BE49-F238E27FC236}">
-                <a16:creationId xmlns:a16="http://schemas.microsoft.com/office/drawing/2014/main" id="{6BF794C2-98B5-4855-8A01-8F94ED9270F6}"/>
+          <p:cNvPr id="4" name="그림 3">
+            <a:extLst>
+              <a:ext uri="{FF2B5EF4-FFF2-40B4-BE49-F238E27FC236}">
+                <a16:creationId xmlns:a16="http://schemas.microsoft.com/office/drawing/2014/main" id="{B00856AA-C446-4AFA-9E19-20D5033B30B9}"/>
               </a:ext>
             </a:extLst>
           </p:cNvPr>
@@ -13122,7 +13889,7 @@
         </p:nvPicPr>
         <p:blipFill rotWithShape="1">
           <a:blip r:embed="rId2"/>
-          <a:srcRect b="2192"/>
+          <a:srcRect b="2616"/>
           <a:stretch/>
         </p:blipFill>
         <p:spPr>

</xml_diff>